<commit_message>
Change reference.pptx to use 16:9 aspect ratio.
This is now Powerpoint's default.
</commit_message>
<xml_diff>
--- a/test/pptx/background-image/output.pptx
+++ b/test/pptx/background-image/output.pptx
@@ -15,7 +15,7 @@
     <p:sldId id="260" r:id="rId6"/>
     <p:sldId id="261" r:id="rId7"/>
   </p:sldIdLst>
-  <p:sldSz cx="9144000" cy="6858000" type="screen4x3"/>
+  <p:sldSz cx="9144000" cy="5143500" type="screen16x9"/>
   <p:notesSz cx="6858000" cy="9144000"/>
   <p:defaultTextStyle>
     <a:defPPr>
@@ -115,12 +115,12 @@
   <p:extLst>
     <p:ext uri="{EFAFB233-063F-42B5-8137-9DF3F51BA10A}">
       <p15:sldGuideLst xmlns:p15="http://schemas.microsoft.com/office/powerpoint/2012/main">
-        <p15:guide id="1" orient="horz" pos="2160">
+        <p15:guide id="1" orient="horz" pos="1620" userDrawn="1">
           <p15:clr>
             <a:srgbClr val="A4A3A4"/>
           </p15:clr>
         </p15:guide>
-        <p15:guide id="2" pos="2880">
+        <p15:guide id="2" pos="2880" userDrawn="1">
           <p15:clr>
             <a:srgbClr val="A4A3A4"/>
           </p15:clr>
@@ -213,7 +213,7 @@
           <a:p>
             <a:fld id="{0F9C1CCF-B725-44A7-AA57-5E433BD85C9F}" type="datetimeFigureOut">
               <a:rPr lang="en-US" smtClean="0"/>
-              <a:t>4/5/2019</a:t>
+              <a:t>1/2/22</a:t>
             </a:fld>
             <a:endParaRPr lang="en-US"/>
           </a:p>
@@ -231,8 +231,8 @@
         </p:nvSpPr>
         <p:spPr>
           <a:xfrm>
-            <a:off x="1371600" y="1143000"/>
-            <a:ext cx="4114800" cy="3086100"/>
+            <a:off x="685800" y="1143000"/>
+            <a:ext cx="5486400" cy="3086100"/>
           </a:xfrm>
           <a:prstGeom prst="rect">
             <a:avLst/>
@@ -277,38 +277,37 @@
           <a:p>
             <a:pPr lvl="0"/>
             <a:r>
-              <a:rPr lang="en-US" smtClean="0"/>
+              <a:rPr lang="en-US"/>
               <a:t>Click to edit Master text styles</a:t>
             </a:r>
           </a:p>
           <a:p>
             <a:pPr lvl="1"/>
             <a:r>
-              <a:rPr lang="en-US" smtClean="0"/>
+              <a:rPr lang="en-US"/>
               <a:t>Second level</a:t>
             </a:r>
           </a:p>
           <a:p>
             <a:pPr lvl="2"/>
             <a:r>
-              <a:rPr lang="en-US" smtClean="0"/>
+              <a:rPr lang="en-US"/>
               <a:t>Third level</a:t>
             </a:r>
           </a:p>
           <a:p>
             <a:pPr lvl="3"/>
             <a:r>
-              <a:rPr lang="en-US" smtClean="0"/>
+              <a:rPr lang="en-US"/>
               <a:t>Fourth level</a:t>
             </a:r>
           </a:p>
           <a:p>
             <a:pPr lvl="4"/>
             <a:r>
-              <a:rPr lang="en-US" smtClean="0"/>
+              <a:rPr lang="en-US"/>
               <a:t>Fifth level</a:t>
             </a:r>
-            <a:endParaRPr lang="en-US"/>
           </a:p>
         </p:txBody>
       </p:sp>
@@ -592,8 +591,8 @@
         </p:nvSpPr>
         <p:spPr>
           <a:xfrm>
-            <a:off x="685800" y="2130425"/>
-            <a:ext cx="7772400" cy="1470025"/>
+            <a:off x="685800" y="1597819"/>
+            <a:ext cx="7772400" cy="1102519"/>
           </a:xfrm>
         </p:spPr>
         <p:txBody>
@@ -601,10 +600,9 @@
           <a:lstStyle/>
           <a:p>
             <a:r>
-              <a:rPr lang="en-US" smtClean="0"/>
+              <a:rPr lang="en-US"/>
               <a:t>Click to edit Master title style</a:t>
             </a:r>
-            <a:endParaRPr lang="en-US"/>
           </a:p>
         </p:txBody>
       </p:sp>
@@ -620,8 +618,8 @@
         </p:nvSpPr>
         <p:spPr>
           <a:xfrm>
-            <a:off x="1371600" y="3886200"/>
-            <a:ext cx="6400800" cy="1752600"/>
+            <a:off x="1371600" y="2914650"/>
+            <a:ext cx="6400800" cy="1314450"/>
           </a:xfrm>
         </p:spPr>
         <p:txBody>
@@ -637,7 +635,7 @@
                 </a:solidFill>
               </a:defRPr>
             </a:lvl1pPr>
-            <a:lvl2pPr marL="457200" indent="0" algn="ctr">
+            <a:lvl2pPr marL="342900" indent="0" algn="ctr">
               <a:buNone/>
               <a:defRPr>
                 <a:solidFill>
@@ -647,7 +645,7 @@
                 </a:solidFill>
               </a:defRPr>
             </a:lvl2pPr>
-            <a:lvl3pPr marL="914400" indent="0" algn="ctr">
+            <a:lvl3pPr marL="685800" indent="0" algn="ctr">
               <a:buNone/>
               <a:defRPr>
                 <a:solidFill>
@@ -657,7 +655,7 @@
                 </a:solidFill>
               </a:defRPr>
             </a:lvl3pPr>
-            <a:lvl4pPr marL="1371600" indent="0" algn="ctr">
+            <a:lvl4pPr marL="1028700" indent="0" algn="ctr">
               <a:buNone/>
               <a:defRPr>
                 <a:solidFill>
@@ -667,7 +665,7 @@
                 </a:solidFill>
               </a:defRPr>
             </a:lvl4pPr>
-            <a:lvl5pPr marL="1828800" indent="0" algn="ctr">
+            <a:lvl5pPr marL="1371600" indent="0" algn="ctr">
               <a:buNone/>
               <a:defRPr>
                 <a:solidFill>
@@ -677,7 +675,7 @@
                 </a:solidFill>
               </a:defRPr>
             </a:lvl5pPr>
-            <a:lvl6pPr marL="2286000" indent="0" algn="ctr">
+            <a:lvl6pPr marL="1714500" indent="0" algn="ctr">
               <a:buNone/>
               <a:defRPr>
                 <a:solidFill>
@@ -687,7 +685,7 @@
                 </a:solidFill>
               </a:defRPr>
             </a:lvl6pPr>
-            <a:lvl7pPr marL="2743200" indent="0" algn="ctr">
+            <a:lvl7pPr marL="2057400" indent="0" algn="ctr">
               <a:buNone/>
               <a:defRPr>
                 <a:solidFill>
@@ -697,7 +695,7 @@
                 </a:solidFill>
               </a:defRPr>
             </a:lvl7pPr>
-            <a:lvl8pPr marL="3200400" indent="0" algn="ctr">
+            <a:lvl8pPr marL="2400300" indent="0" algn="ctr">
               <a:buNone/>
               <a:defRPr>
                 <a:solidFill>
@@ -707,7 +705,7 @@
                 </a:solidFill>
               </a:defRPr>
             </a:lvl8pPr>
-            <a:lvl9pPr marL="3657600" indent="0" algn="ctr">
+            <a:lvl9pPr marL="2743200" indent="0" algn="ctr">
               <a:buNone/>
               <a:defRPr>
                 <a:solidFill>
@@ -720,10 +718,9 @@
           </a:lstStyle>
           <a:p>
             <a:r>
-              <a:rPr lang="en-US" smtClean="0"/>
+              <a:rPr lang="en-US"/>
               <a:t>Click to edit Master subtitle style</a:t>
             </a:r>
-            <a:endParaRPr lang="en-US"/>
           </a:p>
         </p:txBody>
       </p:sp>
@@ -744,7 +741,7 @@
           <a:p>
             <a:fld id="{241EB5C9-1307-BA42-ABA2-0BC069CD8E7F}" type="datetimeFigureOut">
               <a:rPr lang="en-US" smtClean="0"/>
-              <a:t>4/5/2019</a:t>
+              <a:t>1/2/22</a:t>
             </a:fld>
             <a:endParaRPr lang="en-US"/>
           </a:p>
@@ -838,10 +835,9 @@
           <a:lstStyle/>
           <a:p>
             <a:r>
-              <a:rPr lang="en-US" smtClean="0"/>
+              <a:rPr lang="en-US"/>
               <a:t>Click to edit Master title style</a:t>
             </a:r>
-            <a:endParaRPr lang="en-US"/>
           </a:p>
         </p:txBody>
       </p:sp>
@@ -862,38 +858,37 @@
           <a:p>
             <a:pPr lvl="0"/>
             <a:r>
-              <a:rPr lang="en-US" smtClean="0"/>
+              <a:rPr lang="en-US"/>
               <a:t>Click to edit Master text styles</a:t>
             </a:r>
           </a:p>
           <a:p>
             <a:pPr lvl="1"/>
             <a:r>
-              <a:rPr lang="en-US" smtClean="0"/>
+              <a:rPr lang="en-US"/>
               <a:t>Second level</a:t>
             </a:r>
           </a:p>
           <a:p>
             <a:pPr lvl="2"/>
             <a:r>
-              <a:rPr lang="en-US" smtClean="0"/>
+              <a:rPr lang="en-US"/>
               <a:t>Third level</a:t>
             </a:r>
           </a:p>
           <a:p>
             <a:pPr lvl="3"/>
             <a:r>
-              <a:rPr lang="en-US" smtClean="0"/>
+              <a:rPr lang="en-US"/>
               <a:t>Fourth level</a:t>
             </a:r>
           </a:p>
           <a:p>
             <a:pPr lvl="4"/>
             <a:r>
-              <a:rPr lang="en-US" smtClean="0"/>
+              <a:rPr lang="en-US"/>
               <a:t>Fifth level</a:t>
             </a:r>
-            <a:endParaRPr lang="en-US"/>
           </a:p>
         </p:txBody>
       </p:sp>
@@ -914,7 +909,7 @@
           <a:p>
             <a:fld id="{241EB5C9-1307-BA42-ABA2-0BC069CD8E7F}" type="datetimeFigureOut">
               <a:rPr lang="en-US" smtClean="0"/>
-              <a:t>4/5/2019</a:t>
+              <a:t>1/2/22</a:t>
             </a:fld>
             <a:endParaRPr lang="en-US"/>
           </a:p>
@@ -1004,8 +999,8 @@
         </p:nvSpPr>
         <p:spPr>
           <a:xfrm>
-            <a:off x="6629400" y="274638"/>
-            <a:ext cx="2057400" cy="5851525"/>
+            <a:off x="6629400" y="205979"/>
+            <a:ext cx="2057400" cy="4388644"/>
           </a:xfrm>
         </p:spPr>
         <p:txBody>
@@ -1013,10 +1008,9 @@
           <a:lstStyle/>
           <a:p>
             <a:r>
-              <a:rPr lang="en-US" smtClean="0"/>
+              <a:rPr lang="en-US"/>
               <a:t>Click to edit Master title style</a:t>
             </a:r>
-            <a:endParaRPr lang="en-US"/>
           </a:p>
         </p:txBody>
       </p:sp>
@@ -1032,8 +1026,8 @@
         </p:nvSpPr>
         <p:spPr>
           <a:xfrm>
-            <a:off x="457200" y="274638"/>
-            <a:ext cx="6019800" cy="5851525"/>
+            <a:off x="457200" y="205979"/>
+            <a:ext cx="6019800" cy="4388644"/>
           </a:xfrm>
         </p:spPr>
         <p:txBody>
@@ -1042,38 +1036,37 @@
           <a:p>
             <a:pPr lvl="0"/>
             <a:r>
-              <a:rPr lang="en-US" smtClean="0"/>
+              <a:rPr lang="en-US"/>
               <a:t>Click to edit Master text styles</a:t>
             </a:r>
           </a:p>
           <a:p>
             <a:pPr lvl="1"/>
             <a:r>
-              <a:rPr lang="en-US" smtClean="0"/>
+              <a:rPr lang="en-US"/>
               <a:t>Second level</a:t>
             </a:r>
           </a:p>
           <a:p>
             <a:pPr lvl="2"/>
             <a:r>
-              <a:rPr lang="en-US" smtClean="0"/>
+              <a:rPr lang="en-US"/>
               <a:t>Third level</a:t>
             </a:r>
           </a:p>
           <a:p>
             <a:pPr lvl="3"/>
             <a:r>
-              <a:rPr lang="en-US" smtClean="0"/>
+              <a:rPr lang="en-US"/>
               <a:t>Fourth level</a:t>
             </a:r>
           </a:p>
           <a:p>
             <a:pPr lvl="4"/>
             <a:r>
-              <a:rPr lang="en-US" smtClean="0"/>
+              <a:rPr lang="en-US"/>
               <a:t>Fifth level</a:t>
             </a:r>
-            <a:endParaRPr lang="en-US"/>
           </a:p>
         </p:txBody>
       </p:sp>
@@ -1094,7 +1087,7 @@
           <a:p>
             <a:fld id="{241EB5C9-1307-BA42-ABA2-0BC069CD8E7F}" type="datetimeFigureOut">
               <a:rPr lang="en-US" smtClean="0"/>
-              <a:t>4/5/2019</a:t>
+              <a:t>1/2/22</a:t>
             </a:fld>
             <a:endParaRPr lang="en-US"/>
           </a:p>
@@ -1188,10 +1181,9 @@
           <a:lstStyle/>
           <a:p>
             <a:r>
-              <a:rPr lang="en-US" smtClean="0"/>
+              <a:rPr lang="en-US"/>
               <a:t>Click to edit Master title style</a:t>
             </a:r>
-            <a:endParaRPr lang="en-US"/>
           </a:p>
         </p:txBody>
       </p:sp>
@@ -1212,38 +1204,37 @@
           <a:p>
             <a:pPr lvl="0"/>
             <a:r>
-              <a:rPr lang="en-US" smtClean="0"/>
+              <a:rPr lang="en-US"/>
               <a:t>Click to edit Master text styles</a:t>
             </a:r>
           </a:p>
           <a:p>
             <a:pPr lvl="1"/>
             <a:r>
-              <a:rPr lang="en-US" smtClean="0"/>
+              <a:rPr lang="en-US"/>
               <a:t>Second level</a:t>
             </a:r>
           </a:p>
           <a:p>
             <a:pPr lvl="2"/>
             <a:r>
-              <a:rPr lang="en-US" smtClean="0"/>
+              <a:rPr lang="en-US"/>
               <a:t>Third level</a:t>
             </a:r>
           </a:p>
           <a:p>
             <a:pPr lvl="3"/>
             <a:r>
-              <a:rPr lang="en-US" smtClean="0"/>
+              <a:rPr lang="en-US"/>
               <a:t>Fourth level</a:t>
             </a:r>
           </a:p>
           <a:p>
             <a:pPr lvl="4"/>
             <a:r>
-              <a:rPr lang="en-US" smtClean="0"/>
+              <a:rPr lang="en-US"/>
               <a:t>Fifth level</a:t>
             </a:r>
-            <a:endParaRPr lang="en-US"/>
           </a:p>
         </p:txBody>
       </p:sp>
@@ -1264,7 +1255,7 @@
           <a:p>
             <a:fld id="{241EB5C9-1307-BA42-ABA2-0BC069CD8E7F}" type="datetimeFigureOut">
               <a:rPr lang="en-US" smtClean="0"/>
-              <a:t>4/5/2019</a:t>
+              <a:t>1/2/22</a:t>
             </a:fld>
             <a:endParaRPr lang="en-US"/>
           </a:p>
@@ -1354,23 +1345,22 @@
         </p:nvSpPr>
         <p:spPr>
           <a:xfrm>
-            <a:off x="722313" y="4406900"/>
-            <a:ext cx="7772400" cy="1362075"/>
+            <a:off x="722313" y="3305176"/>
+            <a:ext cx="7772400" cy="1021556"/>
           </a:xfrm>
         </p:spPr>
         <p:txBody>
           <a:bodyPr anchor="t"/>
           <a:lstStyle>
             <a:lvl1pPr algn="l">
-              <a:defRPr sz="4000" b="1" cap="all"/>
+              <a:defRPr sz="3000" b="1" cap="all"/>
             </a:lvl1pPr>
           </a:lstStyle>
           <a:p>
             <a:r>
-              <a:rPr lang="en-US" smtClean="0"/>
+              <a:rPr lang="en-US"/>
               <a:t>Click to edit Master title style</a:t>
             </a:r>
-            <a:endParaRPr lang="en-US"/>
           </a:p>
         </p:txBody>
       </p:sp>
@@ -1386,8 +1376,8 @@
         </p:nvSpPr>
         <p:spPr>
           <a:xfrm>
-            <a:off x="722313" y="2906713"/>
-            <a:ext cx="7772400" cy="1500187"/>
+            <a:off x="722313" y="2180035"/>
+            <a:ext cx="7772400" cy="1125140"/>
           </a:xfrm>
         </p:spPr>
         <p:txBody>
@@ -1395,7 +1385,7 @@
           <a:lstStyle>
             <a:lvl1pPr marL="0" indent="0">
               <a:buNone/>
-              <a:defRPr sz="2000">
+              <a:defRPr sz="1500">
                 <a:solidFill>
                   <a:schemeClr val="tx1">
                     <a:tint val="75000"/>
@@ -1403,9 +1393,9 @@
                 </a:solidFill>
               </a:defRPr>
             </a:lvl1pPr>
-            <a:lvl2pPr marL="457200" indent="0">
-              <a:buNone/>
-              <a:defRPr sz="1800">
+            <a:lvl2pPr marL="342900" indent="0">
+              <a:buNone/>
+              <a:defRPr sz="1350">
                 <a:solidFill>
                   <a:schemeClr val="tx1">
                     <a:tint val="75000"/>
@@ -1413,9 +1403,9 @@
                 </a:solidFill>
               </a:defRPr>
             </a:lvl2pPr>
-            <a:lvl3pPr marL="914400" indent="0">
-              <a:buNone/>
-              <a:defRPr sz="1600">
+            <a:lvl3pPr marL="685800" indent="0">
+              <a:buNone/>
+              <a:defRPr sz="1200">
                 <a:solidFill>
                   <a:schemeClr val="tx1">
                     <a:tint val="75000"/>
@@ -1423,9 +1413,9 @@
                 </a:solidFill>
               </a:defRPr>
             </a:lvl3pPr>
-            <a:lvl4pPr marL="1371600" indent="0">
-              <a:buNone/>
-              <a:defRPr sz="1400">
+            <a:lvl4pPr marL="1028700" indent="0">
+              <a:buNone/>
+              <a:defRPr sz="1050">
                 <a:solidFill>
                   <a:schemeClr val="tx1">
                     <a:tint val="75000"/>
@@ -1433,9 +1423,9 @@
                 </a:solidFill>
               </a:defRPr>
             </a:lvl4pPr>
-            <a:lvl5pPr marL="1828800" indent="0">
-              <a:buNone/>
-              <a:defRPr sz="1400">
+            <a:lvl5pPr marL="1371600" indent="0">
+              <a:buNone/>
+              <a:defRPr sz="1050">
                 <a:solidFill>
                   <a:schemeClr val="tx1">
                     <a:tint val="75000"/>
@@ -1443,9 +1433,9 @@
                 </a:solidFill>
               </a:defRPr>
             </a:lvl5pPr>
-            <a:lvl6pPr marL="2286000" indent="0">
-              <a:buNone/>
-              <a:defRPr sz="1400">
+            <a:lvl6pPr marL="1714500" indent="0">
+              <a:buNone/>
+              <a:defRPr sz="1050">
                 <a:solidFill>
                   <a:schemeClr val="tx1">
                     <a:tint val="75000"/>
@@ -1453,9 +1443,9 @@
                 </a:solidFill>
               </a:defRPr>
             </a:lvl6pPr>
-            <a:lvl7pPr marL="2743200" indent="0">
-              <a:buNone/>
-              <a:defRPr sz="1400">
+            <a:lvl7pPr marL="2057400" indent="0">
+              <a:buNone/>
+              <a:defRPr sz="1050">
                 <a:solidFill>
                   <a:schemeClr val="tx1">
                     <a:tint val="75000"/>
@@ -1463,9 +1453,9 @@
                 </a:solidFill>
               </a:defRPr>
             </a:lvl7pPr>
-            <a:lvl8pPr marL="3200400" indent="0">
-              <a:buNone/>
-              <a:defRPr sz="1400">
+            <a:lvl8pPr marL="2400300" indent="0">
+              <a:buNone/>
+              <a:defRPr sz="1050">
                 <a:solidFill>
                   <a:schemeClr val="tx1">
                     <a:tint val="75000"/>
@@ -1473,9 +1463,9 @@
                 </a:solidFill>
               </a:defRPr>
             </a:lvl8pPr>
-            <a:lvl9pPr marL="3657600" indent="0">
-              <a:buNone/>
-              <a:defRPr sz="1400">
+            <a:lvl9pPr marL="2743200" indent="0">
+              <a:buNone/>
+              <a:defRPr sz="1050">
                 <a:solidFill>
                   <a:schemeClr val="tx1">
                     <a:tint val="75000"/>
@@ -1487,7 +1477,7 @@
           <a:p>
             <a:pPr lvl="0"/>
             <a:r>
-              <a:rPr lang="en-US" smtClean="0"/>
+              <a:rPr lang="en-US"/>
               <a:t>Click to edit Master text styles</a:t>
             </a:r>
           </a:p>
@@ -1510,7 +1500,7 @@
           <a:p>
             <a:fld id="{241EB5C9-1307-BA42-ABA2-0BC069CD8E7F}" type="datetimeFigureOut">
               <a:rPr lang="en-US" smtClean="0"/>
-              <a:t>4/5/2019</a:t>
+              <a:t>1/2/22</a:t>
             </a:fld>
             <a:endParaRPr lang="en-US"/>
           </a:p>
@@ -1604,10 +1594,9 @@
           <a:lstStyle/>
           <a:p>
             <a:r>
-              <a:rPr lang="en-US" smtClean="0"/>
+              <a:rPr lang="en-US"/>
               <a:t>Click to edit Master title style</a:t>
             </a:r>
-            <a:endParaRPr lang="en-US"/>
           </a:p>
         </p:txBody>
       </p:sp>
@@ -1623,76 +1612,75 @@
         </p:nvSpPr>
         <p:spPr>
           <a:xfrm>
-            <a:off x="457200" y="1600200"/>
-            <a:ext cx="4038600" cy="4525963"/>
+            <a:off x="457200" y="1200151"/>
+            <a:ext cx="4038600" cy="3394472"/>
           </a:xfrm>
         </p:spPr>
         <p:txBody>
           <a:bodyPr/>
           <a:lstStyle>
             <a:lvl1pPr>
-              <a:defRPr sz="2800"/>
+              <a:defRPr sz="2100"/>
             </a:lvl1pPr>
             <a:lvl2pPr>
-              <a:defRPr sz="2400"/>
+              <a:defRPr sz="1800"/>
             </a:lvl2pPr>
             <a:lvl3pPr>
-              <a:defRPr sz="2000"/>
+              <a:defRPr sz="1500"/>
             </a:lvl3pPr>
             <a:lvl4pPr>
-              <a:defRPr sz="1800"/>
+              <a:defRPr sz="1350"/>
             </a:lvl4pPr>
             <a:lvl5pPr>
-              <a:defRPr sz="1800"/>
+              <a:defRPr sz="1350"/>
             </a:lvl5pPr>
             <a:lvl6pPr>
-              <a:defRPr sz="1800"/>
+              <a:defRPr sz="1350"/>
             </a:lvl6pPr>
             <a:lvl7pPr>
-              <a:defRPr sz="1800"/>
+              <a:defRPr sz="1350"/>
             </a:lvl7pPr>
             <a:lvl8pPr>
-              <a:defRPr sz="1800"/>
+              <a:defRPr sz="1350"/>
             </a:lvl8pPr>
             <a:lvl9pPr>
-              <a:defRPr sz="1800"/>
+              <a:defRPr sz="1350"/>
             </a:lvl9pPr>
           </a:lstStyle>
           <a:p>
             <a:pPr lvl="0"/>
             <a:r>
-              <a:rPr lang="en-US" smtClean="0"/>
+              <a:rPr lang="en-US"/>
               <a:t>Click to edit Master text styles</a:t>
             </a:r>
           </a:p>
           <a:p>
             <a:pPr lvl="1"/>
             <a:r>
-              <a:rPr lang="en-US" smtClean="0"/>
+              <a:rPr lang="en-US"/>
               <a:t>Second level</a:t>
             </a:r>
           </a:p>
           <a:p>
             <a:pPr lvl="2"/>
             <a:r>
-              <a:rPr lang="en-US" smtClean="0"/>
+              <a:rPr lang="en-US"/>
               <a:t>Third level</a:t>
             </a:r>
           </a:p>
           <a:p>
             <a:pPr lvl="3"/>
             <a:r>
-              <a:rPr lang="en-US" smtClean="0"/>
+              <a:rPr lang="en-US"/>
               <a:t>Fourth level</a:t>
             </a:r>
           </a:p>
           <a:p>
             <a:pPr lvl="4"/>
             <a:r>
-              <a:rPr lang="en-US" smtClean="0"/>
+              <a:rPr lang="en-US"/>
               <a:t>Fifth level</a:t>
             </a:r>
-            <a:endParaRPr lang="en-US"/>
           </a:p>
         </p:txBody>
       </p:sp>
@@ -1708,76 +1696,75 @@
         </p:nvSpPr>
         <p:spPr>
           <a:xfrm>
-            <a:off x="4648200" y="1600200"/>
-            <a:ext cx="4038600" cy="4525963"/>
+            <a:off x="4648200" y="1200151"/>
+            <a:ext cx="4038600" cy="3394472"/>
           </a:xfrm>
         </p:spPr>
         <p:txBody>
           <a:bodyPr/>
           <a:lstStyle>
             <a:lvl1pPr>
-              <a:defRPr sz="2800"/>
+              <a:defRPr sz="2100"/>
             </a:lvl1pPr>
             <a:lvl2pPr>
-              <a:defRPr sz="2400"/>
+              <a:defRPr sz="1800"/>
             </a:lvl2pPr>
             <a:lvl3pPr>
-              <a:defRPr sz="2000"/>
+              <a:defRPr sz="1500"/>
             </a:lvl3pPr>
             <a:lvl4pPr>
-              <a:defRPr sz="1800"/>
+              <a:defRPr sz="1350"/>
             </a:lvl4pPr>
             <a:lvl5pPr>
-              <a:defRPr sz="1800"/>
+              <a:defRPr sz="1350"/>
             </a:lvl5pPr>
             <a:lvl6pPr>
-              <a:defRPr sz="1800"/>
+              <a:defRPr sz="1350"/>
             </a:lvl6pPr>
             <a:lvl7pPr>
-              <a:defRPr sz="1800"/>
+              <a:defRPr sz="1350"/>
             </a:lvl7pPr>
             <a:lvl8pPr>
-              <a:defRPr sz="1800"/>
+              <a:defRPr sz="1350"/>
             </a:lvl8pPr>
             <a:lvl9pPr>
-              <a:defRPr sz="1800"/>
+              <a:defRPr sz="1350"/>
             </a:lvl9pPr>
           </a:lstStyle>
           <a:p>
             <a:pPr lvl="0"/>
             <a:r>
-              <a:rPr lang="en-US" smtClean="0"/>
+              <a:rPr lang="en-US"/>
               <a:t>Click to edit Master text styles</a:t>
             </a:r>
           </a:p>
           <a:p>
             <a:pPr lvl="1"/>
             <a:r>
-              <a:rPr lang="en-US" smtClean="0"/>
+              <a:rPr lang="en-US"/>
               <a:t>Second level</a:t>
             </a:r>
           </a:p>
           <a:p>
             <a:pPr lvl="2"/>
             <a:r>
-              <a:rPr lang="en-US" smtClean="0"/>
+              <a:rPr lang="en-US"/>
               <a:t>Third level</a:t>
             </a:r>
           </a:p>
           <a:p>
             <a:pPr lvl="3"/>
             <a:r>
-              <a:rPr lang="en-US" smtClean="0"/>
+              <a:rPr lang="en-US"/>
               <a:t>Fourth level</a:t>
             </a:r>
           </a:p>
           <a:p>
             <a:pPr lvl="4"/>
             <a:r>
-              <a:rPr lang="en-US" smtClean="0"/>
+              <a:rPr lang="en-US"/>
               <a:t>Fifth level</a:t>
             </a:r>
-            <a:endParaRPr lang="en-US"/>
           </a:p>
         </p:txBody>
       </p:sp>
@@ -1798,7 +1785,7 @@
           <a:p>
             <a:fld id="{241EB5C9-1307-BA42-ABA2-0BC069CD8E7F}" type="datetimeFigureOut">
               <a:rPr lang="en-US" smtClean="0"/>
-              <a:t>4/5/2019</a:t>
+              <a:t>1/2/22</a:t>
             </a:fld>
             <a:endParaRPr lang="en-US"/>
           </a:p>
@@ -1896,10 +1883,9 @@
           </a:lstStyle>
           <a:p>
             <a:r>
-              <a:rPr lang="en-US" smtClean="0"/>
+              <a:rPr lang="en-US"/>
               <a:t>Click to edit Master title style</a:t>
             </a:r>
-            <a:endParaRPr lang="en-US"/>
           </a:p>
         </p:txBody>
       </p:sp>
@@ -1915,8 +1901,8 @@
         </p:nvSpPr>
         <p:spPr>
           <a:xfrm>
-            <a:off x="457200" y="1535113"/>
-            <a:ext cx="4040188" cy="639762"/>
+            <a:off x="457200" y="1151335"/>
+            <a:ext cx="4040188" cy="479822"/>
           </a:xfrm>
         </p:spPr>
         <p:txBody>
@@ -1924,45 +1910,45 @@
           <a:lstStyle>
             <a:lvl1pPr marL="0" indent="0">
               <a:buNone/>
-              <a:defRPr sz="2400" b="1"/>
+              <a:defRPr sz="1800" b="1"/>
             </a:lvl1pPr>
-            <a:lvl2pPr marL="457200" indent="0">
-              <a:buNone/>
-              <a:defRPr sz="2000" b="1"/>
+            <a:lvl2pPr marL="342900" indent="0">
+              <a:buNone/>
+              <a:defRPr sz="1500" b="1"/>
             </a:lvl2pPr>
-            <a:lvl3pPr marL="914400" indent="0">
-              <a:buNone/>
-              <a:defRPr sz="1800" b="1"/>
+            <a:lvl3pPr marL="685800" indent="0">
+              <a:buNone/>
+              <a:defRPr sz="1350" b="1"/>
             </a:lvl3pPr>
-            <a:lvl4pPr marL="1371600" indent="0">
-              <a:buNone/>
-              <a:defRPr sz="1600" b="1"/>
+            <a:lvl4pPr marL="1028700" indent="0">
+              <a:buNone/>
+              <a:defRPr sz="1200" b="1"/>
             </a:lvl4pPr>
-            <a:lvl5pPr marL="1828800" indent="0">
-              <a:buNone/>
-              <a:defRPr sz="1600" b="1"/>
+            <a:lvl5pPr marL="1371600" indent="0">
+              <a:buNone/>
+              <a:defRPr sz="1200" b="1"/>
             </a:lvl5pPr>
-            <a:lvl6pPr marL="2286000" indent="0">
-              <a:buNone/>
-              <a:defRPr sz="1600" b="1"/>
+            <a:lvl6pPr marL="1714500" indent="0">
+              <a:buNone/>
+              <a:defRPr sz="1200" b="1"/>
             </a:lvl6pPr>
-            <a:lvl7pPr marL="2743200" indent="0">
-              <a:buNone/>
-              <a:defRPr sz="1600" b="1"/>
+            <a:lvl7pPr marL="2057400" indent="0">
+              <a:buNone/>
+              <a:defRPr sz="1200" b="1"/>
             </a:lvl7pPr>
-            <a:lvl8pPr marL="3200400" indent="0">
-              <a:buNone/>
-              <a:defRPr sz="1600" b="1"/>
+            <a:lvl8pPr marL="2400300" indent="0">
+              <a:buNone/>
+              <a:defRPr sz="1200" b="1"/>
             </a:lvl8pPr>
-            <a:lvl9pPr marL="3657600" indent="0">
-              <a:buNone/>
-              <a:defRPr sz="1600" b="1"/>
+            <a:lvl9pPr marL="2743200" indent="0">
+              <a:buNone/>
+              <a:defRPr sz="1200" b="1"/>
             </a:lvl9pPr>
           </a:lstStyle>
           <a:p>
             <a:pPr lvl="0"/>
             <a:r>
-              <a:rPr lang="en-US" smtClean="0"/>
+              <a:rPr lang="en-US"/>
               <a:t>Click to edit Master text styles</a:t>
             </a:r>
           </a:p>
@@ -1980,76 +1966,75 @@
         </p:nvSpPr>
         <p:spPr>
           <a:xfrm>
-            <a:off x="457200" y="2174875"/>
-            <a:ext cx="4040188" cy="3951288"/>
+            <a:off x="457200" y="1631156"/>
+            <a:ext cx="4040188" cy="2963466"/>
           </a:xfrm>
         </p:spPr>
         <p:txBody>
           <a:bodyPr/>
           <a:lstStyle>
             <a:lvl1pPr>
-              <a:defRPr sz="2400"/>
+              <a:defRPr sz="1800"/>
             </a:lvl1pPr>
             <a:lvl2pPr>
-              <a:defRPr sz="2000"/>
+              <a:defRPr sz="1500"/>
             </a:lvl2pPr>
             <a:lvl3pPr>
-              <a:defRPr sz="1800"/>
+              <a:defRPr sz="1350"/>
             </a:lvl3pPr>
             <a:lvl4pPr>
-              <a:defRPr sz="1600"/>
+              <a:defRPr sz="1200"/>
             </a:lvl4pPr>
             <a:lvl5pPr>
-              <a:defRPr sz="1600"/>
+              <a:defRPr sz="1200"/>
             </a:lvl5pPr>
             <a:lvl6pPr>
-              <a:defRPr sz="1600"/>
+              <a:defRPr sz="1200"/>
             </a:lvl6pPr>
             <a:lvl7pPr>
-              <a:defRPr sz="1600"/>
+              <a:defRPr sz="1200"/>
             </a:lvl7pPr>
             <a:lvl8pPr>
-              <a:defRPr sz="1600"/>
+              <a:defRPr sz="1200"/>
             </a:lvl8pPr>
             <a:lvl9pPr>
-              <a:defRPr sz="1600"/>
+              <a:defRPr sz="1200"/>
             </a:lvl9pPr>
           </a:lstStyle>
           <a:p>
             <a:pPr lvl="0"/>
             <a:r>
-              <a:rPr lang="en-US" smtClean="0"/>
+              <a:rPr lang="en-US"/>
               <a:t>Click to edit Master text styles</a:t>
             </a:r>
           </a:p>
           <a:p>
             <a:pPr lvl="1"/>
             <a:r>
-              <a:rPr lang="en-US" smtClean="0"/>
+              <a:rPr lang="en-US"/>
               <a:t>Second level</a:t>
             </a:r>
           </a:p>
           <a:p>
             <a:pPr lvl="2"/>
             <a:r>
-              <a:rPr lang="en-US" smtClean="0"/>
+              <a:rPr lang="en-US"/>
               <a:t>Third level</a:t>
             </a:r>
           </a:p>
           <a:p>
             <a:pPr lvl="3"/>
             <a:r>
-              <a:rPr lang="en-US" smtClean="0"/>
+              <a:rPr lang="en-US"/>
               <a:t>Fourth level</a:t>
             </a:r>
           </a:p>
           <a:p>
             <a:pPr lvl="4"/>
             <a:r>
-              <a:rPr lang="en-US" smtClean="0"/>
+              <a:rPr lang="en-US"/>
               <a:t>Fifth level</a:t>
             </a:r>
-            <a:endParaRPr lang="en-US"/>
           </a:p>
         </p:txBody>
       </p:sp>
@@ -2065,8 +2050,8 @@
         </p:nvSpPr>
         <p:spPr>
           <a:xfrm>
-            <a:off x="4645025" y="1535113"/>
-            <a:ext cx="4041775" cy="639762"/>
+            <a:off x="4645026" y="1151335"/>
+            <a:ext cx="4041775" cy="479822"/>
           </a:xfrm>
         </p:spPr>
         <p:txBody>
@@ -2074,45 +2059,45 @@
           <a:lstStyle>
             <a:lvl1pPr marL="0" indent="0">
               <a:buNone/>
-              <a:defRPr sz="2400" b="1"/>
+              <a:defRPr sz="1800" b="1"/>
             </a:lvl1pPr>
-            <a:lvl2pPr marL="457200" indent="0">
-              <a:buNone/>
-              <a:defRPr sz="2000" b="1"/>
+            <a:lvl2pPr marL="342900" indent="0">
+              <a:buNone/>
+              <a:defRPr sz="1500" b="1"/>
             </a:lvl2pPr>
-            <a:lvl3pPr marL="914400" indent="0">
-              <a:buNone/>
-              <a:defRPr sz="1800" b="1"/>
+            <a:lvl3pPr marL="685800" indent="0">
+              <a:buNone/>
+              <a:defRPr sz="1350" b="1"/>
             </a:lvl3pPr>
-            <a:lvl4pPr marL="1371600" indent="0">
-              <a:buNone/>
-              <a:defRPr sz="1600" b="1"/>
+            <a:lvl4pPr marL="1028700" indent="0">
+              <a:buNone/>
+              <a:defRPr sz="1200" b="1"/>
             </a:lvl4pPr>
-            <a:lvl5pPr marL="1828800" indent="0">
-              <a:buNone/>
-              <a:defRPr sz="1600" b="1"/>
+            <a:lvl5pPr marL="1371600" indent="0">
+              <a:buNone/>
+              <a:defRPr sz="1200" b="1"/>
             </a:lvl5pPr>
-            <a:lvl6pPr marL="2286000" indent="0">
-              <a:buNone/>
-              <a:defRPr sz="1600" b="1"/>
+            <a:lvl6pPr marL="1714500" indent="0">
+              <a:buNone/>
+              <a:defRPr sz="1200" b="1"/>
             </a:lvl6pPr>
-            <a:lvl7pPr marL="2743200" indent="0">
-              <a:buNone/>
-              <a:defRPr sz="1600" b="1"/>
+            <a:lvl7pPr marL="2057400" indent="0">
+              <a:buNone/>
+              <a:defRPr sz="1200" b="1"/>
             </a:lvl7pPr>
-            <a:lvl8pPr marL="3200400" indent="0">
-              <a:buNone/>
-              <a:defRPr sz="1600" b="1"/>
+            <a:lvl8pPr marL="2400300" indent="0">
+              <a:buNone/>
+              <a:defRPr sz="1200" b="1"/>
             </a:lvl8pPr>
-            <a:lvl9pPr marL="3657600" indent="0">
-              <a:buNone/>
-              <a:defRPr sz="1600" b="1"/>
+            <a:lvl9pPr marL="2743200" indent="0">
+              <a:buNone/>
+              <a:defRPr sz="1200" b="1"/>
             </a:lvl9pPr>
           </a:lstStyle>
           <a:p>
             <a:pPr lvl="0"/>
             <a:r>
-              <a:rPr lang="en-US" smtClean="0"/>
+              <a:rPr lang="en-US"/>
               <a:t>Click to edit Master text styles</a:t>
             </a:r>
           </a:p>
@@ -2130,76 +2115,75 @@
         </p:nvSpPr>
         <p:spPr>
           <a:xfrm>
-            <a:off x="4645025" y="2174875"/>
-            <a:ext cx="4041775" cy="3951288"/>
+            <a:off x="4645026" y="1631156"/>
+            <a:ext cx="4041775" cy="2963466"/>
           </a:xfrm>
         </p:spPr>
         <p:txBody>
           <a:bodyPr/>
           <a:lstStyle>
             <a:lvl1pPr>
-              <a:defRPr sz="2400"/>
+              <a:defRPr sz="1800"/>
             </a:lvl1pPr>
             <a:lvl2pPr>
-              <a:defRPr sz="2000"/>
+              <a:defRPr sz="1500"/>
             </a:lvl2pPr>
             <a:lvl3pPr>
-              <a:defRPr sz="1800"/>
+              <a:defRPr sz="1350"/>
             </a:lvl3pPr>
             <a:lvl4pPr>
-              <a:defRPr sz="1600"/>
+              <a:defRPr sz="1200"/>
             </a:lvl4pPr>
             <a:lvl5pPr>
-              <a:defRPr sz="1600"/>
+              <a:defRPr sz="1200"/>
             </a:lvl5pPr>
             <a:lvl6pPr>
-              <a:defRPr sz="1600"/>
+              <a:defRPr sz="1200"/>
             </a:lvl6pPr>
             <a:lvl7pPr>
-              <a:defRPr sz="1600"/>
+              <a:defRPr sz="1200"/>
             </a:lvl7pPr>
             <a:lvl8pPr>
-              <a:defRPr sz="1600"/>
+              <a:defRPr sz="1200"/>
             </a:lvl8pPr>
             <a:lvl9pPr>
-              <a:defRPr sz="1600"/>
+              <a:defRPr sz="1200"/>
             </a:lvl9pPr>
           </a:lstStyle>
           <a:p>
             <a:pPr lvl="0"/>
             <a:r>
-              <a:rPr lang="en-US" smtClean="0"/>
+              <a:rPr lang="en-US"/>
               <a:t>Click to edit Master text styles</a:t>
             </a:r>
           </a:p>
           <a:p>
             <a:pPr lvl="1"/>
             <a:r>
-              <a:rPr lang="en-US" smtClean="0"/>
+              <a:rPr lang="en-US"/>
               <a:t>Second level</a:t>
             </a:r>
           </a:p>
           <a:p>
             <a:pPr lvl="2"/>
             <a:r>
-              <a:rPr lang="en-US" smtClean="0"/>
+              <a:rPr lang="en-US"/>
               <a:t>Third level</a:t>
             </a:r>
           </a:p>
           <a:p>
             <a:pPr lvl="3"/>
             <a:r>
-              <a:rPr lang="en-US" smtClean="0"/>
+              <a:rPr lang="en-US"/>
               <a:t>Fourth level</a:t>
             </a:r>
           </a:p>
           <a:p>
             <a:pPr lvl="4"/>
             <a:r>
-              <a:rPr lang="en-US" smtClean="0"/>
+              <a:rPr lang="en-US"/>
               <a:t>Fifth level</a:t>
             </a:r>
-            <a:endParaRPr lang="en-US"/>
           </a:p>
         </p:txBody>
       </p:sp>
@@ -2220,7 +2204,7 @@
           <a:p>
             <a:fld id="{241EB5C9-1307-BA42-ABA2-0BC069CD8E7F}" type="datetimeFigureOut">
               <a:rPr lang="en-US" smtClean="0"/>
-              <a:t>4/5/2019</a:t>
+              <a:t>1/2/22</a:t>
             </a:fld>
             <a:endParaRPr lang="en-US"/>
           </a:p>
@@ -2314,10 +2298,9 @@
           <a:lstStyle/>
           <a:p>
             <a:r>
-              <a:rPr lang="en-US" smtClean="0"/>
+              <a:rPr lang="en-US"/>
               <a:t>Click to edit Master title style</a:t>
             </a:r>
-            <a:endParaRPr lang="en-US"/>
           </a:p>
         </p:txBody>
       </p:sp>
@@ -2338,7 +2321,7 @@
           <a:p>
             <a:fld id="{241EB5C9-1307-BA42-ABA2-0BC069CD8E7F}" type="datetimeFigureOut">
               <a:rPr lang="en-US" smtClean="0"/>
-              <a:t>4/5/2019</a:t>
+              <a:t>1/2/22</a:t>
             </a:fld>
             <a:endParaRPr lang="en-US"/>
           </a:p>
@@ -2433,7 +2416,7 @@
           <a:p>
             <a:fld id="{241EB5C9-1307-BA42-ABA2-0BC069CD8E7F}" type="datetimeFigureOut">
               <a:rPr lang="en-US" smtClean="0"/>
-              <a:t>4/5/2019</a:t>
+              <a:t>1/2/22</a:t>
             </a:fld>
             <a:endParaRPr lang="en-US"/>
           </a:p>
@@ -2523,23 +2506,22 @@
         </p:nvSpPr>
         <p:spPr>
           <a:xfrm>
-            <a:off x="457200" y="273050"/>
-            <a:ext cx="3008313" cy="1162050"/>
+            <a:off x="457201" y="204787"/>
+            <a:ext cx="3008313" cy="871538"/>
           </a:xfrm>
         </p:spPr>
         <p:txBody>
           <a:bodyPr anchor="b"/>
           <a:lstStyle>
             <a:lvl1pPr algn="l">
-              <a:defRPr sz="2000" b="1"/>
+              <a:defRPr sz="1500" b="1"/>
             </a:lvl1pPr>
           </a:lstStyle>
           <a:p>
             <a:r>
-              <a:rPr lang="en-US" smtClean="0"/>
+              <a:rPr lang="en-US"/>
               <a:t>Click to edit Master title style</a:t>
             </a:r>
-            <a:endParaRPr lang="en-US"/>
           </a:p>
         </p:txBody>
       </p:sp>
@@ -2555,76 +2537,75 @@
         </p:nvSpPr>
         <p:spPr>
           <a:xfrm>
-            <a:off x="3575050" y="273050"/>
-            <a:ext cx="5111750" cy="5853113"/>
+            <a:off x="3575050" y="204788"/>
+            <a:ext cx="5111750" cy="4389835"/>
           </a:xfrm>
         </p:spPr>
         <p:txBody>
           <a:bodyPr/>
           <a:lstStyle>
             <a:lvl1pPr>
-              <a:defRPr sz="3200"/>
+              <a:defRPr sz="2400"/>
             </a:lvl1pPr>
             <a:lvl2pPr>
-              <a:defRPr sz="2800"/>
+              <a:defRPr sz="2100"/>
             </a:lvl2pPr>
             <a:lvl3pPr>
-              <a:defRPr sz="2400"/>
+              <a:defRPr sz="1800"/>
             </a:lvl3pPr>
             <a:lvl4pPr>
-              <a:defRPr sz="2000"/>
+              <a:defRPr sz="1500"/>
             </a:lvl4pPr>
             <a:lvl5pPr>
-              <a:defRPr sz="2000"/>
+              <a:defRPr sz="1500"/>
             </a:lvl5pPr>
             <a:lvl6pPr>
-              <a:defRPr sz="2000"/>
+              <a:defRPr sz="1500"/>
             </a:lvl6pPr>
             <a:lvl7pPr>
-              <a:defRPr sz="2000"/>
+              <a:defRPr sz="1500"/>
             </a:lvl7pPr>
             <a:lvl8pPr>
-              <a:defRPr sz="2000"/>
+              <a:defRPr sz="1500"/>
             </a:lvl8pPr>
             <a:lvl9pPr>
-              <a:defRPr sz="2000"/>
+              <a:defRPr sz="1500"/>
             </a:lvl9pPr>
           </a:lstStyle>
           <a:p>
             <a:pPr lvl="0"/>
             <a:r>
-              <a:rPr lang="en-US" smtClean="0"/>
+              <a:rPr lang="en-US"/>
               <a:t>Click to edit Master text styles</a:t>
             </a:r>
           </a:p>
           <a:p>
             <a:pPr lvl="1"/>
             <a:r>
-              <a:rPr lang="en-US" smtClean="0"/>
+              <a:rPr lang="en-US"/>
               <a:t>Second level</a:t>
             </a:r>
           </a:p>
           <a:p>
             <a:pPr lvl="2"/>
             <a:r>
-              <a:rPr lang="en-US" smtClean="0"/>
+              <a:rPr lang="en-US"/>
               <a:t>Third level</a:t>
             </a:r>
           </a:p>
           <a:p>
             <a:pPr lvl="3"/>
             <a:r>
-              <a:rPr lang="en-US" smtClean="0"/>
+              <a:rPr lang="en-US"/>
               <a:t>Fourth level</a:t>
             </a:r>
           </a:p>
           <a:p>
             <a:pPr lvl="4"/>
             <a:r>
-              <a:rPr lang="en-US" smtClean="0"/>
+              <a:rPr lang="en-US"/>
               <a:t>Fifth level</a:t>
             </a:r>
-            <a:endParaRPr lang="en-US"/>
           </a:p>
         </p:txBody>
       </p:sp>
@@ -2640,8 +2621,8 @@
         </p:nvSpPr>
         <p:spPr>
           <a:xfrm>
-            <a:off x="457200" y="1435100"/>
-            <a:ext cx="3008313" cy="4691063"/>
+            <a:off x="457201" y="1076326"/>
+            <a:ext cx="3008313" cy="3518297"/>
           </a:xfrm>
         </p:spPr>
         <p:txBody>
@@ -2649,45 +2630,45 @@
           <a:lstStyle>
             <a:lvl1pPr marL="0" indent="0">
               <a:buNone/>
-              <a:defRPr sz="1400"/>
+              <a:defRPr sz="1050"/>
             </a:lvl1pPr>
-            <a:lvl2pPr marL="457200" indent="0">
-              <a:buNone/>
-              <a:defRPr sz="1200"/>
+            <a:lvl2pPr marL="342900" indent="0">
+              <a:buNone/>
+              <a:defRPr sz="900"/>
             </a:lvl2pPr>
-            <a:lvl3pPr marL="914400" indent="0">
-              <a:buNone/>
-              <a:defRPr sz="1000"/>
+            <a:lvl3pPr marL="685800" indent="0">
+              <a:buNone/>
+              <a:defRPr sz="750"/>
             </a:lvl3pPr>
-            <a:lvl4pPr marL="1371600" indent="0">
-              <a:buNone/>
-              <a:defRPr sz="900"/>
+            <a:lvl4pPr marL="1028700" indent="0">
+              <a:buNone/>
+              <a:defRPr sz="675"/>
             </a:lvl4pPr>
-            <a:lvl5pPr marL="1828800" indent="0">
-              <a:buNone/>
-              <a:defRPr sz="900"/>
+            <a:lvl5pPr marL="1371600" indent="0">
+              <a:buNone/>
+              <a:defRPr sz="675"/>
             </a:lvl5pPr>
-            <a:lvl6pPr marL="2286000" indent="0">
-              <a:buNone/>
-              <a:defRPr sz="900"/>
+            <a:lvl6pPr marL="1714500" indent="0">
+              <a:buNone/>
+              <a:defRPr sz="675"/>
             </a:lvl6pPr>
-            <a:lvl7pPr marL="2743200" indent="0">
-              <a:buNone/>
-              <a:defRPr sz="900"/>
+            <a:lvl7pPr marL="2057400" indent="0">
+              <a:buNone/>
+              <a:defRPr sz="675"/>
             </a:lvl7pPr>
-            <a:lvl8pPr marL="3200400" indent="0">
-              <a:buNone/>
-              <a:defRPr sz="900"/>
+            <a:lvl8pPr marL="2400300" indent="0">
+              <a:buNone/>
+              <a:defRPr sz="675"/>
             </a:lvl8pPr>
-            <a:lvl9pPr marL="3657600" indent="0">
-              <a:buNone/>
-              <a:defRPr sz="900"/>
+            <a:lvl9pPr marL="2743200" indent="0">
+              <a:buNone/>
+              <a:defRPr sz="675"/>
             </a:lvl9pPr>
           </a:lstStyle>
           <a:p>
             <a:pPr lvl="0"/>
             <a:r>
-              <a:rPr lang="en-US" smtClean="0"/>
+              <a:rPr lang="en-US"/>
               <a:t>Click to edit Master text styles</a:t>
             </a:r>
           </a:p>
@@ -2710,7 +2691,7 @@
           <a:p>
             <a:fld id="{241EB5C9-1307-BA42-ABA2-0BC069CD8E7F}" type="datetimeFigureOut">
               <a:rPr lang="en-US" smtClean="0"/>
-              <a:t>4/5/2019</a:t>
+              <a:t>1/2/22</a:t>
             </a:fld>
             <a:endParaRPr lang="en-US"/>
           </a:p>
@@ -2800,23 +2781,22 @@
         </p:nvSpPr>
         <p:spPr>
           <a:xfrm>
-            <a:off x="1792288" y="4800600"/>
-            <a:ext cx="5486400" cy="566738"/>
+            <a:off x="1792288" y="3600450"/>
+            <a:ext cx="5486400" cy="425054"/>
           </a:xfrm>
         </p:spPr>
         <p:txBody>
           <a:bodyPr anchor="b"/>
           <a:lstStyle>
             <a:lvl1pPr algn="l">
-              <a:defRPr sz="2000" b="1"/>
+              <a:defRPr sz="1500" b="1"/>
             </a:lvl1pPr>
           </a:lstStyle>
           <a:p>
             <a:r>
-              <a:rPr lang="en-US" smtClean="0"/>
+              <a:rPr lang="en-US"/>
               <a:t>Click to edit Master title style</a:t>
             </a:r>
-            <a:endParaRPr lang="en-US"/>
           </a:p>
         </p:txBody>
       </p:sp>
@@ -2832,8 +2812,8 @@
         </p:nvSpPr>
         <p:spPr>
           <a:xfrm>
-            <a:off x="1792288" y="612775"/>
-            <a:ext cx="5486400" cy="4114800"/>
+            <a:off x="1792288" y="459581"/>
+            <a:ext cx="5486400" cy="3086100"/>
           </a:xfrm>
         </p:spPr>
         <p:txBody>
@@ -2841,39 +2821,39 @@
           <a:lstStyle>
             <a:lvl1pPr marL="0" indent="0">
               <a:buNone/>
-              <a:defRPr sz="3200"/>
+              <a:defRPr sz="2400"/>
             </a:lvl1pPr>
-            <a:lvl2pPr marL="457200" indent="0">
-              <a:buNone/>
-              <a:defRPr sz="2800"/>
+            <a:lvl2pPr marL="342900" indent="0">
+              <a:buNone/>
+              <a:defRPr sz="2100"/>
             </a:lvl2pPr>
-            <a:lvl3pPr marL="914400" indent="0">
-              <a:buNone/>
-              <a:defRPr sz="2400"/>
+            <a:lvl3pPr marL="685800" indent="0">
+              <a:buNone/>
+              <a:defRPr sz="1800"/>
             </a:lvl3pPr>
-            <a:lvl4pPr marL="1371600" indent="0">
-              <a:buNone/>
-              <a:defRPr sz="2000"/>
+            <a:lvl4pPr marL="1028700" indent="0">
+              <a:buNone/>
+              <a:defRPr sz="1500"/>
             </a:lvl4pPr>
-            <a:lvl5pPr marL="1828800" indent="0">
-              <a:buNone/>
-              <a:defRPr sz="2000"/>
+            <a:lvl5pPr marL="1371600" indent="0">
+              <a:buNone/>
+              <a:defRPr sz="1500"/>
             </a:lvl5pPr>
-            <a:lvl6pPr marL="2286000" indent="0">
-              <a:buNone/>
-              <a:defRPr sz="2000"/>
+            <a:lvl6pPr marL="1714500" indent="0">
+              <a:buNone/>
+              <a:defRPr sz="1500"/>
             </a:lvl6pPr>
-            <a:lvl7pPr marL="2743200" indent="0">
-              <a:buNone/>
-              <a:defRPr sz="2000"/>
+            <a:lvl7pPr marL="2057400" indent="0">
+              <a:buNone/>
+              <a:defRPr sz="1500"/>
             </a:lvl7pPr>
-            <a:lvl8pPr marL="3200400" indent="0">
-              <a:buNone/>
-              <a:defRPr sz="2000"/>
+            <a:lvl8pPr marL="2400300" indent="0">
+              <a:buNone/>
+              <a:defRPr sz="1500"/>
             </a:lvl8pPr>
-            <a:lvl9pPr marL="3657600" indent="0">
-              <a:buNone/>
-              <a:defRPr sz="2000"/>
+            <a:lvl9pPr marL="2743200" indent="0">
+              <a:buNone/>
+              <a:defRPr sz="1500"/>
             </a:lvl9pPr>
           </a:lstStyle>
           <a:p>
@@ -2893,8 +2873,8 @@
         </p:nvSpPr>
         <p:spPr>
           <a:xfrm>
-            <a:off x="1792288" y="5367338"/>
-            <a:ext cx="5486400" cy="804862"/>
+            <a:off x="1792288" y="4025503"/>
+            <a:ext cx="5486400" cy="603647"/>
           </a:xfrm>
         </p:spPr>
         <p:txBody>
@@ -2902,45 +2882,45 @@
           <a:lstStyle>
             <a:lvl1pPr marL="0" indent="0">
               <a:buNone/>
-              <a:defRPr sz="1400"/>
+              <a:defRPr sz="1050"/>
             </a:lvl1pPr>
-            <a:lvl2pPr marL="457200" indent="0">
-              <a:buNone/>
-              <a:defRPr sz="1200"/>
+            <a:lvl2pPr marL="342900" indent="0">
+              <a:buNone/>
+              <a:defRPr sz="900"/>
             </a:lvl2pPr>
-            <a:lvl3pPr marL="914400" indent="0">
-              <a:buNone/>
-              <a:defRPr sz="1000"/>
+            <a:lvl3pPr marL="685800" indent="0">
+              <a:buNone/>
+              <a:defRPr sz="750"/>
             </a:lvl3pPr>
-            <a:lvl4pPr marL="1371600" indent="0">
-              <a:buNone/>
-              <a:defRPr sz="900"/>
+            <a:lvl4pPr marL="1028700" indent="0">
+              <a:buNone/>
+              <a:defRPr sz="675"/>
             </a:lvl4pPr>
-            <a:lvl5pPr marL="1828800" indent="0">
-              <a:buNone/>
-              <a:defRPr sz="900"/>
+            <a:lvl5pPr marL="1371600" indent="0">
+              <a:buNone/>
+              <a:defRPr sz="675"/>
             </a:lvl5pPr>
-            <a:lvl6pPr marL="2286000" indent="0">
-              <a:buNone/>
-              <a:defRPr sz="900"/>
+            <a:lvl6pPr marL="1714500" indent="0">
+              <a:buNone/>
+              <a:defRPr sz="675"/>
             </a:lvl6pPr>
-            <a:lvl7pPr marL="2743200" indent="0">
-              <a:buNone/>
-              <a:defRPr sz="900"/>
+            <a:lvl7pPr marL="2057400" indent="0">
+              <a:buNone/>
+              <a:defRPr sz="675"/>
             </a:lvl7pPr>
-            <a:lvl8pPr marL="3200400" indent="0">
-              <a:buNone/>
-              <a:defRPr sz="900"/>
+            <a:lvl8pPr marL="2400300" indent="0">
+              <a:buNone/>
+              <a:defRPr sz="675"/>
             </a:lvl8pPr>
-            <a:lvl9pPr marL="3657600" indent="0">
-              <a:buNone/>
-              <a:defRPr sz="900"/>
+            <a:lvl9pPr marL="2743200" indent="0">
+              <a:buNone/>
+              <a:defRPr sz="675"/>
             </a:lvl9pPr>
           </a:lstStyle>
           <a:p>
             <a:pPr lvl="0"/>
             <a:r>
-              <a:rPr lang="en-US" smtClean="0"/>
+              <a:rPr lang="en-US"/>
               <a:t>Click to edit Master text styles</a:t>
             </a:r>
           </a:p>
@@ -2963,7 +2943,7 @@
           <a:p>
             <a:fld id="{241EB5C9-1307-BA42-ABA2-0BC069CD8E7F}" type="datetimeFigureOut">
               <a:rPr lang="en-US" smtClean="0"/>
-              <a:t>4/5/2019</a:t>
+              <a:t>1/2/22</a:t>
             </a:fld>
             <a:endParaRPr lang="en-US"/>
           </a:p>
@@ -3058,8 +3038,8 @@
         </p:nvSpPr>
         <p:spPr>
           <a:xfrm>
-            <a:off x="457200" y="274638"/>
-            <a:ext cx="8229600" cy="1143000"/>
+            <a:off x="457200" y="205979"/>
+            <a:ext cx="8229600" cy="857250"/>
           </a:xfrm>
           <a:prstGeom prst="rect">
             <a:avLst/>
@@ -3072,10 +3052,9 @@
           <a:lstStyle/>
           <a:p>
             <a:r>
-              <a:rPr lang="en-US" smtClean="0"/>
+              <a:rPr lang="en-US"/>
               <a:t>Click to edit Master title style</a:t>
             </a:r>
-            <a:endParaRPr lang="en-US"/>
           </a:p>
         </p:txBody>
       </p:sp>
@@ -3091,8 +3070,8 @@
         </p:nvSpPr>
         <p:spPr>
           <a:xfrm>
-            <a:off x="457200" y="1600200"/>
-            <a:ext cx="8229600" cy="4525963"/>
+            <a:off x="457200" y="1200151"/>
+            <a:ext cx="8229600" cy="3394472"/>
           </a:xfrm>
           <a:prstGeom prst="rect">
             <a:avLst/>
@@ -3106,38 +3085,37 @@
           <a:p>
             <a:pPr lvl="0"/>
             <a:r>
-              <a:rPr lang="en-US" smtClean="0"/>
+              <a:rPr lang="en-US"/>
               <a:t>Click to edit Master text styles</a:t>
             </a:r>
           </a:p>
           <a:p>
             <a:pPr lvl="1"/>
             <a:r>
-              <a:rPr lang="en-US" smtClean="0"/>
+              <a:rPr lang="en-US"/>
               <a:t>Second level</a:t>
             </a:r>
           </a:p>
           <a:p>
             <a:pPr lvl="2"/>
             <a:r>
-              <a:rPr lang="en-US" smtClean="0"/>
+              <a:rPr lang="en-US"/>
               <a:t>Third level</a:t>
             </a:r>
           </a:p>
           <a:p>
             <a:pPr lvl="3"/>
             <a:r>
-              <a:rPr lang="en-US" smtClean="0"/>
+              <a:rPr lang="en-US"/>
               <a:t>Fourth level</a:t>
             </a:r>
           </a:p>
           <a:p>
             <a:pPr lvl="4"/>
             <a:r>
-              <a:rPr lang="en-US" smtClean="0"/>
+              <a:rPr lang="en-US"/>
               <a:t>Fifth level</a:t>
             </a:r>
-            <a:endParaRPr lang="en-US"/>
           </a:p>
         </p:txBody>
       </p:sp>
@@ -3153,8 +3131,8 @@
         </p:nvSpPr>
         <p:spPr>
           <a:xfrm>
-            <a:off x="457200" y="6356350"/>
-            <a:ext cx="2133600" cy="365125"/>
+            <a:off x="457200" y="4767263"/>
+            <a:ext cx="2133600" cy="273844"/>
           </a:xfrm>
           <a:prstGeom prst="rect">
             <a:avLst/>
@@ -3164,7 +3142,7 @@
           <a:bodyPr anchor="ctr" bIns="45720" lIns="91440" rIns="91440" rtlCol="0" tIns="45720" vert="horz"/>
           <a:lstStyle>
             <a:lvl1pPr algn="l">
-              <a:defRPr sz="1200">
+              <a:defRPr sz="900">
                 <a:solidFill>
                   <a:schemeClr val="tx1">
                     <a:tint val="75000"/>
@@ -3176,7 +3154,7 @@
           <a:p>
             <a:fld id="{241EB5C9-1307-BA42-ABA2-0BC069CD8E7F}" type="datetimeFigureOut">
               <a:rPr lang="en-US" smtClean="0"/>
-              <a:t>4/5/2019</a:t>
+              <a:t>1/2/22</a:t>
             </a:fld>
             <a:endParaRPr lang="en-US"/>
           </a:p>
@@ -3194,8 +3172,8 @@
         </p:nvSpPr>
         <p:spPr>
           <a:xfrm>
-            <a:off x="3124200" y="6356350"/>
-            <a:ext cx="2895600" cy="365125"/>
+            <a:off x="3124200" y="4767263"/>
+            <a:ext cx="2895600" cy="273844"/>
           </a:xfrm>
           <a:prstGeom prst="rect">
             <a:avLst/>
@@ -3205,7 +3183,7 @@
           <a:bodyPr anchor="ctr" bIns="45720" lIns="91440" rIns="91440" rtlCol="0" tIns="45720" vert="horz"/>
           <a:lstStyle>
             <a:lvl1pPr algn="ctr">
-              <a:defRPr sz="1200">
+              <a:defRPr sz="900">
                 <a:solidFill>
                   <a:schemeClr val="tx1">
                     <a:tint val="75000"/>
@@ -3231,8 +3209,8 @@
         </p:nvSpPr>
         <p:spPr>
           <a:xfrm>
-            <a:off x="6553200" y="6356350"/>
-            <a:ext cx="2133600" cy="365125"/>
+            <a:off x="6553200" y="4767263"/>
+            <a:ext cx="2133600" cy="273844"/>
           </a:xfrm>
           <a:prstGeom prst="rect">
             <a:avLst/>
@@ -3242,7 +3220,7 @@
           <a:bodyPr anchor="ctr" bIns="45720" lIns="91440" rIns="91440" rtlCol="0" tIns="45720" vert="horz"/>
           <a:lstStyle>
             <a:lvl1pPr algn="r">
-              <a:defRPr sz="1200">
+              <a:defRPr sz="900">
                 <a:solidFill>
                   <a:schemeClr val="tx1">
                     <a:tint val="75000"/>
@@ -3283,12 +3261,12 @@
   </p:sldLayoutIdLst>
   <p:txStyles>
     <p:titleStyle>
-      <a:lvl1pPr algn="ctr" defTabSz="457200" eaLnBrk="1" hangingPunct="1" latinLnBrk="0" rtl="0">
+      <a:lvl1pPr algn="ctr" defTabSz="342900" eaLnBrk="1" hangingPunct="1" latinLnBrk="0" rtl="0">
         <a:spcBef>
           <a:spcPct val="0"/>
         </a:spcBef>
         <a:buNone/>
-        <a:defRPr kern="1200" sz="4400">
+        <a:defRPr kern="1200" sz="3300">
           <a:solidFill>
             <a:schemeClr val="tx1"/>
           </a:solidFill>
@@ -3299,37 +3277,7 @@
       </a:lvl1pPr>
     </p:titleStyle>
     <p:bodyStyle>
-      <a:lvl1pPr algn="l" defTabSz="457200" eaLnBrk="1" hangingPunct="1" indent="-457200" latinLnBrk="0" marL="457200" rtl="0">
-        <a:spcBef>
-          <a:spcPct val="20000"/>
-        </a:spcBef>
-        <a:buFont typeface="Arial"/>
-        <a:buChar char="•"/>
-        <a:defRPr kern="1200" sz="3200">
-          <a:solidFill>
-            <a:schemeClr val="tx1"/>
-          </a:solidFill>
-          <a:latin typeface="+mn-lt"/>
-          <a:ea typeface="+mn-ea"/>
-          <a:cs typeface="+mn-cs"/>
-        </a:defRPr>
-      </a:lvl1pPr>
-      <a:lvl2pPr algn="l" defTabSz="457200" eaLnBrk="1" hangingPunct="1" indent="-457200" latinLnBrk="0" marL="914400" rtl="0">
-        <a:spcBef>
-          <a:spcPct val="20000"/>
-        </a:spcBef>
-        <a:buFont typeface="Arial"/>
-        <a:buChar char="–"/>
-        <a:defRPr kern="1200" sz="2800">
-          <a:solidFill>
-            <a:schemeClr val="tx1"/>
-          </a:solidFill>
-          <a:latin typeface="+mn-lt"/>
-          <a:ea typeface="+mn-ea"/>
-          <a:cs typeface="+mn-cs"/>
-        </a:defRPr>
-      </a:lvl2pPr>
-      <a:lvl3pPr algn="l" defTabSz="457200" eaLnBrk="1" hangingPunct="1" indent="-457200" latinLnBrk="0" marL="1371600" rtl="0">
+      <a:lvl1pPr algn="l" defTabSz="342900" eaLnBrk="1" hangingPunct="1" indent="-342900" latinLnBrk="0" marL="342900" rtl="0">
         <a:spcBef>
           <a:spcPct val="20000"/>
         </a:spcBef>
@@ -3343,14 +3291,44 @@
           <a:ea typeface="+mn-ea"/>
           <a:cs typeface="+mn-cs"/>
         </a:defRPr>
-      </a:lvl3pPr>
-      <a:lvl4pPr algn="l" defTabSz="457200" eaLnBrk="1" hangingPunct="1" indent="-457200" latinLnBrk="0" marL="1828800" rtl="0">
+      </a:lvl1pPr>
+      <a:lvl2pPr algn="l" defTabSz="342900" eaLnBrk="1" hangingPunct="1" indent="-342900" latinLnBrk="0" marL="685800" rtl="0">
         <a:spcBef>
           <a:spcPct val="20000"/>
         </a:spcBef>
         <a:buFont typeface="Arial"/>
         <a:buChar char="–"/>
-        <a:defRPr kern="1200" sz="2000">
+        <a:defRPr kern="1200" sz="2100">
+          <a:solidFill>
+            <a:schemeClr val="tx1"/>
+          </a:solidFill>
+          <a:latin typeface="+mn-lt"/>
+          <a:ea typeface="+mn-ea"/>
+          <a:cs typeface="+mn-cs"/>
+        </a:defRPr>
+      </a:lvl2pPr>
+      <a:lvl3pPr algn="l" defTabSz="342900" eaLnBrk="1" hangingPunct="1" indent="-342900" latinLnBrk="0" marL="1028700" rtl="0">
+        <a:spcBef>
+          <a:spcPct val="20000"/>
+        </a:spcBef>
+        <a:buFont typeface="Arial"/>
+        <a:buChar char="•"/>
+        <a:defRPr kern="1200" sz="1800">
+          <a:solidFill>
+            <a:schemeClr val="tx1"/>
+          </a:solidFill>
+          <a:latin typeface="+mn-lt"/>
+          <a:ea typeface="+mn-ea"/>
+          <a:cs typeface="+mn-cs"/>
+        </a:defRPr>
+      </a:lvl3pPr>
+      <a:lvl4pPr algn="l" defTabSz="342900" eaLnBrk="1" hangingPunct="1" indent="-342900" latinLnBrk="0" marL="1371600" rtl="0">
+        <a:spcBef>
+          <a:spcPct val="20000"/>
+        </a:spcBef>
+        <a:buFont typeface="Arial"/>
+        <a:buChar char="–"/>
+        <a:defRPr kern="1200" sz="1500">
           <a:solidFill>
             <a:schemeClr val="tx1"/>
           </a:solidFill>
@@ -3359,13 +3337,13 @@
           <a:cs typeface="+mn-cs"/>
         </a:defRPr>
       </a:lvl4pPr>
-      <a:lvl5pPr algn="l" defTabSz="457200" eaLnBrk="1" hangingPunct="1" indent="-457200" latinLnBrk="0" marL="2286000" rtl="0">
+      <a:lvl5pPr algn="l" defTabSz="342900" eaLnBrk="1" hangingPunct="1" indent="-342900" latinLnBrk="0" marL="1714500" rtl="0">
         <a:spcBef>
           <a:spcPct val="20000"/>
         </a:spcBef>
         <a:buFont typeface="Arial"/>
         <a:buChar char="»"/>
-        <a:defRPr kern="1200" sz="2000">
+        <a:defRPr kern="1200" sz="1500">
           <a:solidFill>
             <a:schemeClr val="tx1"/>
           </a:solidFill>
@@ -3374,13 +3352,13 @@
           <a:cs typeface="+mn-cs"/>
         </a:defRPr>
       </a:lvl5pPr>
-      <a:lvl6pPr algn="l" defTabSz="457200" eaLnBrk="1" hangingPunct="1" indent="-457200" latinLnBrk="0" marL="2743200" rtl="0">
+      <a:lvl6pPr algn="l" defTabSz="342900" eaLnBrk="1" hangingPunct="1" indent="-342900" latinLnBrk="0" marL="2057400" rtl="0">
         <a:spcBef>
           <a:spcPct val="20000"/>
         </a:spcBef>
         <a:buFont typeface="Arial"/>
         <a:buChar char="•"/>
-        <a:defRPr kern="1200" sz="2000">
+        <a:defRPr kern="1200" sz="1500">
           <a:solidFill>
             <a:schemeClr val="tx1"/>
           </a:solidFill>
@@ -3389,13 +3367,13 @@
           <a:cs typeface="+mn-cs"/>
         </a:defRPr>
       </a:lvl6pPr>
-      <a:lvl7pPr algn="l" defTabSz="457200" eaLnBrk="1" hangingPunct="1" indent="-457200" latinLnBrk="0" marL="3200400" rtl="0">
+      <a:lvl7pPr algn="l" defTabSz="342900" eaLnBrk="1" hangingPunct="1" indent="-342900" latinLnBrk="0" marL="2400300" rtl="0">
         <a:spcBef>
           <a:spcPct val="20000"/>
         </a:spcBef>
         <a:buFont typeface="Arial"/>
         <a:buChar char="•"/>
-        <a:defRPr kern="1200" sz="2000">
+        <a:defRPr kern="1200" sz="1500">
           <a:solidFill>
             <a:schemeClr val="tx1"/>
           </a:solidFill>
@@ -3404,13 +3382,13 @@
           <a:cs typeface="+mn-cs"/>
         </a:defRPr>
       </a:lvl7pPr>
-      <a:lvl8pPr algn="l" defTabSz="457200" eaLnBrk="1" hangingPunct="1" indent="-457200" latinLnBrk="0" marL="3657600" rtl="0">
+      <a:lvl8pPr algn="l" defTabSz="342900" eaLnBrk="1" hangingPunct="1" indent="-342900" latinLnBrk="0" marL="2743200" rtl="0">
         <a:spcBef>
           <a:spcPct val="20000"/>
         </a:spcBef>
         <a:buFont typeface="Arial"/>
         <a:buChar char="•"/>
-        <a:defRPr kern="1200" sz="2000">
+        <a:defRPr kern="1200" sz="1500">
           <a:solidFill>
             <a:schemeClr val="tx1"/>
           </a:solidFill>
@@ -3419,13 +3397,13 @@
           <a:cs typeface="+mn-cs"/>
         </a:defRPr>
       </a:lvl8pPr>
-      <a:lvl9pPr algn="l" defTabSz="457200" eaLnBrk="1" hangingPunct="1" indent="-457200" latinLnBrk="0" marL="4114800" rtl="0">
+      <a:lvl9pPr algn="l" defTabSz="342900" eaLnBrk="1" hangingPunct="1" indent="-342900" latinLnBrk="0" marL="3086100" rtl="0">
         <a:spcBef>
           <a:spcPct val="20000"/>
         </a:spcBef>
         <a:buFont typeface="Arial"/>
         <a:buChar char="•"/>
-        <a:defRPr kern="1200" sz="2000">
+        <a:defRPr kern="1200" sz="1500">
           <a:solidFill>
             <a:schemeClr val="tx1"/>
           </a:solidFill>
@@ -3439,8 +3417,8 @@
       <a:defPPr>
         <a:defRPr lang="en-US"/>
       </a:defPPr>
-      <a:lvl1pPr algn="l" defTabSz="457200" eaLnBrk="1" hangingPunct="1" latinLnBrk="0" marL="0" rtl="0">
-        <a:defRPr kern="1200" sz="1800">
+      <a:lvl1pPr algn="l" defTabSz="342900" eaLnBrk="1" hangingPunct="1" latinLnBrk="0" marL="0" rtl="0">
+        <a:defRPr kern="1200" sz="1350">
           <a:solidFill>
             <a:schemeClr val="tx1"/>
           </a:solidFill>
@@ -3449,8 +3427,8 @@
           <a:cs typeface="+mn-cs"/>
         </a:defRPr>
       </a:lvl1pPr>
-      <a:lvl2pPr algn="l" defTabSz="457200" eaLnBrk="1" hangingPunct="1" latinLnBrk="0" marL="457200" rtl="0">
-        <a:defRPr kern="1200" sz="1800">
+      <a:lvl2pPr algn="l" defTabSz="342900" eaLnBrk="1" hangingPunct="1" latinLnBrk="0" marL="342900" rtl="0">
+        <a:defRPr kern="1200" sz="1350">
           <a:solidFill>
             <a:schemeClr val="tx1"/>
           </a:solidFill>
@@ -3459,8 +3437,8 @@
           <a:cs typeface="+mn-cs"/>
         </a:defRPr>
       </a:lvl2pPr>
-      <a:lvl3pPr algn="l" defTabSz="457200" eaLnBrk="1" hangingPunct="1" latinLnBrk="0" marL="914400" rtl="0">
-        <a:defRPr kern="1200" sz="1800">
+      <a:lvl3pPr algn="l" defTabSz="342900" eaLnBrk="1" hangingPunct="1" latinLnBrk="0" marL="685800" rtl="0">
+        <a:defRPr kern="1200" sz="1350">
           <a:solidFill>
             <a:schemeClr val="tx1"/>
           </a:solidFill>
@@ -3469,8 +3447,8 @@
           <a:cs typeface="+mn-cs"/>
         </a:defRPr>
       </a:lvl3pPr>
-      <a:lvl4pPr algn="l" defTabSz="457200" eaLnBrk="1" hangingPunct="1" latinLnBrk="0" marL="1371600" rtl="0">
-        <a:defRPr kern="1200" sz="1800">
+      <a:lvl4pPr algn="l" defTabSz="342900" eaLnBrk="1" hangingPunct="1" latinLnBrk="0" marL="1028700" rtl="0">
+        <a:defRPr kern="1200" sz="1350">
           <a:solidFill>
             <a:schemeClr val="tx1"/>
           </a:solidFill>
@@ -3479,8 +3457,8 @@
           <a:cs typeface="+mn-cs"/>
         </a:defRPr>
       </a:lvl4pPr>
-      <a:lvl5pPr algn="l" defTabSz="457200" eaLnBrk="1" hangingPunct="1" latinLnBrk="0" marL="1828800" rtl="0">
-        <a:defRPr kern="1200" sz="1800">
+      <a:lvl5pPr algn="l" defTabSz="342900" eaLnBrk="1" hangingPunct="1" latinLnBrk="0" marL="1371600" rtl="0">
+        <a:defRPr kern="1200" sz="1350">
           <a:solidFill>
             <a:schemeClr val="tx1"/>
           </a:solidFill>
@@ -3489,8 +3467,8 @@
           <a:cs typeface="+mn-cs"/>
         </a:defRPr>
       </a:lvl5pPr>
-      <a:lvl6pPr algn="l" defTabSz="457200" eaLnBrk="1" hangingPunct="1" latinLnBrk="0" marL="2286000" rtl="0">
-        <a:defRPr kern="1200" sz="1800">
+      <a:lvl6pPr algn="l" defTabSz="342900" eaLnBrk="1" hangingPunct="1" latinLnBrk="0" marL="1714500" rtl="0">
+        <a:defRPr kern="1200" sz="1350">
           <a:solidFill>
             <a:schemeClr val="tx1"/>
           </a:solidFill>
@@ -3499,8 +3477,8 @@
           <a:cs typeface="+mn-cs"/>
         </a:defRPr>
       </a:lvl6pPr>
-      <a:lvl7pPr algn="l" defTabSz="457200" eaLnBrk="1" hangingPunct="1" latinLnBrk="0" marL="2743200" rtl="0">
-        <a:defRPr kern="1200" sz="1800">
+      <a:lvl7pPr algn="l" defTabSz="342900" eaLnBrk="1" hangingPunct="1" latinLnBrk="0" marL="2057400" rtl="0">
+        <a:defRPr kern="1200" sz="1350">
           <a:solidFill>
             <a:schemeClr val="tx1"/>
           </a:solidFill>
@@ -3509,8 +3487,8 @@
           <a:cs typeface="+mn-cs"/>
         </a:defRPr>
       </a:lvl7pPr>
-      <a:lvl8pPr algn="l" defTabSz="457200" eaLnBrk="1" hangingPunct="1" latinLnBrk="0" marL="3200400" rtl="0">
-        <a:defRPr kern="1200" sz="1800">
+      <a:lvl8pPr algn="l" defTabSz="342900" eaLnBrk="1" hangingPunct="1" latinLnBrk="0" marL="2400300" rtl="0">
+        <a:defRPr kern="1200" sz="1350">
           <a:solidFill>
             <a:schemeClr val="tx1"/>
           </a:solidFill>
@@ -3519,8 +3497,8 @@
           <a:cs typeface="+mn-cs"/>
         </a:defRPr>
       </a:lvl8pPr>
-      <a:lvl9pPr algn="l" defTabSz="457200" eaLnBrk="1" hangingPunct="1" latinLnBrk="0" marL="3657600" rtl="0">
-        <a:defRPr kern="1200" sz="1800">
+      <a:lvl9pPr algn="l" defTabSz="342900" eaLnBrk="1" hangingPunct="1" latinLnBrk="0" marL="2743200" rtl="0">
+        <a:defRPr kern="1200" sz="1350">
           <a:solidFill>
             <a:schemeClr val="tx1"/>
           </a:solidFill>
@@ -3545,7 +3523,7 @@
           </a:blip>
           <a:srcRect/>
           <a:stretch>
-            <a:fillRect t="-23000" b="-23000"/>
+            <a:fillRect t="-48000" b="-48000"/>
           </a:stretch>
         </a:blipFill>
         <a:effectsLst/>
@@ -3577,8 +3555,8 @@
         </p:nvSpPr>
         <p:spPr>
           <a:xfrm>
-            <a:off x="722313" y="4406900"/>
-            <a:ext cx="7772400" cy="1362075"/>
+            <a:off x="722313" y="3305176"/>
+            <a:ext cx="7772400" cy="1021556"/>
           </a:xfrm>
         </p:spPr>
         <p:txBody>
@@ -3611,7 +3589,7 @@
           </a:blip>
           <a:srcRect/>
           <a:stretch>
-            <a:fillRect t="-17000" b="-17000"/>
+            <a:fillRect t="-39000" b="-39000"/>
           </a:stretch>
         </a:blipFill>
         <a:effectsLst/>
@@ -3697,7 +3675,7 @@
           </a:blip>
           <a:srcRect/>
           <a:stretch>
-            <a:fillRect t="-23000" b="-23000"/>
+            <a:fillRect t="-48000" b="-48000"/>
           </a:stretch>
         </a:blipFill>
         <a:effectsLst/>
@@ -3783,7 +3761,7 @@
           </a:blip>
           <a:srcRect/>
           <a:stretch>
-            <a:fillRect t="-23000" b="-23000"/>
+            <a:fillRect t="-48000" b="-48000"/>
           </a:stretch>
         </a:blipFill>
         <a:effectsLst/>
@@ -3894,7 +3872,7 @@
           </a:blip>
           <a:srcRect/>
           <a:stretch>
-            <a:fillRect t="-23000" b="-23000"/>
+            <a:fillRect t="-48000" b="-48000"/>
           </a:stretch>
         </a:blipFill>
         <a:effectsLst/>
@@ -3926,8 +3904,8 @@
         </p:nvSpPr>
         <p:spPr>
           <a:xfrm>
-            <a:off x="457200" y="273050"/>
-            <a:ext cx="3008313" cy="1162050"/>
+            <a:off x="457201" y="204787"/>
+            <a:ext cx="3008313" cy="871538"/>
           </a:xfrm>
         </p:spPr>
         <p:txBody>
@@ -3985,8 +3963,8 @@
         </p:blipFill>
         <p:spPr bwMode="auto">
           <a:xfrm>
-            <a:off x="3568700" y="381000"/>
-            <a:ext cx="5105400" cy="5105400"/>
+            <a:off x="4191000" y="203200"/>
+            <a:ext cx="3873500" cy="3873500"/>
           </a:xfrm>
           <a:prstGeom prst="rect">
             <a:avLst/>
@@ -4007,7 +3985,7 @@
         </p:nvSpPr>
         <p:spPr>
           <a:xfrm>
-            <a:off x="3568700" y="5600700"/>
+            <a:off x="3568700" y="4076700"/>
             <a:ext cx="5105400" cy="508000"/>
           </a:xfrm>
           <a:prstGeom prst="rect">
@@ -4045,7 +4023,7 @@
           </a:blip>
           <a:srcRect/>
           <a:stretch>
-            <a:fillRect t="-17000" b="-17000"/>
+            <a:fillRect t="-39000" b="-39000"/>
           </a:stretch>
         </a:blipFill>
         <a:effectsLst/>

</xml_diff>

<commit_message>
Powerpoint writer: use reference-doc font for captions.
Fix #9896.
</commit_message>
<xml_diff>
--- a/test/pptx/background-image/output.pptx
+++ b/test/pptx/background-image/output.pptx
@@ -3981,7 +3981,9 @@
         <p:nvSpPr>
           <p:cNvPr id="1" name="TextBox 3"/>
           <p:cNvSpPr txBox="1"/>
-          <p:nvPr/>
+          <p:nvPr>
+            <p:ph idx="1"/>
+          </p:nvPr>
         </p:nvSpPr>
         <p:spPr>
           <a:xfrm>

</xml_diff>